<commit_message>
Tweak ParserFactory sequence diagram
</commit_message>
<xml_diff>
--- a/diagrams/modelling/modellingBehaviours/sequenceDiagramsIntermediate/parserFactory.pptx
+++ b/diagrams/modelling/modellingBehaviours/sequenceDiagramsIntermediate/parserFactory.pptx
@@ -161,7 +161,7 @@
           <a:lstStyle/>
           <a:p>
             <a:r>
-              <a:rPr lang="en-US" smtClean="0"/>
+              <a:rPr lang="en-US"/>
               <a:t>Click to edit Master title style</a:t>
             </a:r>
             <a:endParaRPr lang="en-SG"/>
@@ -280,7 +280,7 @@
           </a:lstStyle>
           <a:p>
             <a:r>
-              <a:rPr lang="en-US" smtClean="0"/>
+              <a:rPr lang="en-US"/>
               <a:t>Click to edit Master subtitle style</a:t>
             </a:r>
             <a:endParaRPr lang="en-SG"/>
@@ -304,7 +304,7 @@
           <a:p>
             <a:fld id="{5C63EA63-0159-4067-AC1E-0A923D89E69F}" type="datetimeFigureOut">
               <a:rPr lang="en-SG" smtClean="0"/>
-              <a:t>3/10/2017</a:t>
+              <a:t>17/9/2023</a:t>
             </a:fld>
             <a:endParaRPr lang="en-SG"/>
           </a:p>
@@ -398,7 +398,7 @@
           <a:lstStyle/>
           <a:p>
             <a:r>
-              <a:rPr lang="en-US" smtClean="0"/>
+              <a:rPr lang="en-US"/>
               <a:t>Click to edit Master title style</a:t>
             </a:r>
             <a:endParaRPr lang="en-SG"/>
@@ -422,35 +422,35 @@
           <a:p>
             <a:pPr lvl="0"/>
             <a:r>
-              <a:rPr lang="en-US" smtClean="0"/>
+              <a:rPr lang="en-US"/>
               <a:t>Click to edit Master text styles</a:t>
             </a:r>
           </a:p>
           <a:p>
             <a:pPr lvl="1"/>
             <a:r>
-              <a:rPr lang="en-US" smtClean="0"/>
+              <a:rPr lang="en-US"/>
               <a:t>Second level</a:t>
             </a:r>
           </a:p>
           <a:p>
             <a:pPr lvl="2"/>
             <a:r>
-              <a:rPr lang="en-US" smtClean="0"/>
+              <a:rPr lang="en-US"/>
               <a:t>Third level</a:t>
             </a:r>
           </a:p>
           <a:p>
             <a:pPr lvl="3"/>
             <a:r>
-              <a:rPr lang="en-US" smtClean="0"/>
+              <a:rPr lang="en-US"/>
               <a:t>Fourth level</a:t>
             </a:r>
           </a:p>
           <a:p>
             <a:pPr lvl="4"/>
             <a:r>
-              <a:rPr lang="en-US" smtClean="0"/>
+              <a:rPr lang="en-US"/>
               <a:t>Fifth level</a:t>
             </a:r>
             <a:endParaRPr lang="en-SG"/>
@@ -474,7 +474,7 @@
           <a:p>
             <a:fld id="{5C63EA63-0159-4067-AC1E-0A923D89E69F}" type="datetimeFigureOut">
               <a:rPr lang="en-SG" smtClean="0"/>
-              <a:t>3/10/2017</a:t>
+              <a:t>17/9/2023</a:t>
             </a:fld>
             <a:endParaRPr lang="en-SG"/>
           </a:p>
@@ -573,7 +573,7 @@
           <a:lstStyle/>
           <a:p>
             <a:r>
-              <a:rPr lang="en-US" smtClean="0"/>
+              <a:rPr lang="en-US"/>
               <a:t>Click to edit Master title style</a:t>
             </a:r>
             <a:endParaRPr lang="en-SG"/>
@@ -602,35 +602,35 @@
           <a:p>
             <a:pPr lvl="0"/>
             <a:r>
-              <a:rPr lang="en-US" smtClean="0"/>
+              <a:rPr lang="en-US"/>
               <a:t>Click to edit Master text styles</a:t>
             </a:r>
           </a:p>
           <a:p>
             <a:pPr lvl="1"/>
             <a:r>
-              <a:rPr lang="en-US" smtClean="0"/>
+              <a:rPr lang="en-US"/>
               <a:t>Second level</a:t>
             </a:r>
           </a:p>
           <a:p>
             <a:pPr lvl="2"/>
             <a:r>
-              <a:rPr lang="en-US" smtClean="0"/>
+              <a:rPr lang="en-US"/>
               <a:t>Third level</a:t>
             </a:r>
           </a:p>
           <a:p>
             <a:pPr lvl="3"/>
             <a:r>
-              <a:rPr lang="en-US" smtClean="0"/>
+              <a:rPr lang="en-US"/>
               <a:t>Fourth level</a:t>
             </a:r>
           </a:p>
           <a:p>
             <a:pPr lvl="4"/>
             <a:r>
-              <a:rPr lang="en-US" smtClean="0"/>
+              <a:rPr lang="en-US"/>
               <a:t>Fifth level</a:t>
             </a:r>
             <a:endParaRPr lang="en-SG"/>
@@ -654,7 +654,7 @@
           <a:p>
             <a:fld id="{5C63EA63-0159-4067-AC1E-0A923D89E69F}" type="datetimeFigureOut">
               <a:rPr lang="en-SG" smtClean="0"/>
-              <a:t>3/10/2017</a:t>
+              <a:t>17/9/2023</a:t>
             </a:fld>
             <a:endParaRPr lang="en-SG"/>
           </a:p>
@@ -748,7 +748,7 @@
           <a:lstStyle/>
           <a:p>
             <a:r>
-              <a:rPr lang="en-US" smtClean="0"/>
+              <a:rPr lang="en-US"/>
               <a:t>Click to edit Master title style</a:t>
             </a:r>
             <a:endParaRPr lang="en-SG"/>
@@ -772,35 +772,35 @@
           <a:p>
             <a:pPr lvl="0"/>
             <a:r>
-              <a:rPr lang="en-US" smtClean="0"/>
+              <a:rPr lang="en-US"/>
               <a:t>Click to edit Master text styles</a:t>
             </a:r>
           </a:p>
           <a:p>
             <a:pPr lvl="1"/>
             <a:r>
-              <a:rPr lang="en-US" smtClean="0"/>
+              <a:rPr lang="en-US"/>
               <a:t>Second level</a:t>
             </a:r>
           </a:p>
           <a:p>
             <a:pPr lvl="2"/>
             <a:r>
-              <a:rPr lang="en-US" smtClean="0"/>
+              <a:rPr lang="en-US"/>
               <a:t>Third level</a:t>
             </a:r>
           </a:p>
           <a:p>
             <a:pPr lvl="3"/>
             <a:r>
-              <a:rPr lang="en-US" smtClean="0"/>
+              <a:rPr lang="en-US"/>
               <a:t>Fourth level</a:t>
             </a:r>
           </a:p>
           <a:p>
             <a:pPr lvl="4"/>
             <a:r>
-              <a:rPr lang="en-US" smtClean="0"/>
+              <a:rPr lang="en-US"/>
               <a:t>Fifth level</a:t>
             </a:r>
             <a:endParaRPr lang="en-SG"/>
@@ -824,7 +824,7 @@
           <a:p>
             <a:fld id="{5C63EA63-0159-4067-AC1E-0A923D89E69F}" type="datetimeFigureOut">
               <a:rPr lang="en-SG" smtClean="0"/>
-              <a:t>3/10/2017</a:t>
+              <a:t>17/9/2023</a:t>
             </a:fld>
             <a:endParaRPr lang="en-SG"/>
           </a:p>
@@ -927,7 +927,7 @@
           </a:lstStyle>
           <a:p>
             <a:r>
-              <a:rPr lang="en-US" smtClean="0"/>
+              <a:rPr lang="en-US"/>
               <a:t>Click to edit Master title style</a:t>
             </a:r>
             <a:endParaRPr lang="en-SG"/>
@@ -1047,7 +1047,7 @@
           <a:p>
             <a:pPr lvl="0"/>
             <a:r>
-              <a:rPr lang="en-US" smtClean="0"/>
+              <a:rPr lang="en-US"/>
               <a:t>Click to edit Master text styles</a:t>
             </a:r>
           </a:p>
@@ -1070,7 +1070,7 @@
           <a:p>
             <a:fld id="{5C63EA63-0159-4067-AC1E-0A923D89E69F}" type="datetimeFigureOut">
               <a:rPr lang="en-SG" smtClean="0"/>
-              <a:t>3/10/2017</a:t>
+              <a:t>17/9/2023</a:t>
             </a:fld>
             <a:endParaRPr lang="en-SG"/>
           </a:p>
@@ -1164,7 +1164,7 @@
           <a:lstStyle/>
           <a:p>
             <a:r>
-              <a:rPr lang="en-US" smtClean="0"/>
+              <a:rPr lang="en-US"/>
               <a:t>Click to edit Master title style</a:t>
             </a:r>
             <a:endParaRPr lang="en-SG"/>
@@ -1221,35 +1221,35 @@
           <a:p>
             <a:pPr lvl="0"/>
             <a:r>
-              <a:rPr lang="en-US" smtClean="0"/>
+              <a:rPr lang="en-US"/>
               <a:t>Click to edit Master text styles</a:t>
             </a:r>
           </a:p>
           <a:p>
             <a:pPr lvl="1"/>
             <a:r>
-              <a:rPr lang="en-US" smtClean="0"/>
+              <a:rPr lang="en-US"/>
               <a:t>Second level</a:t>
             </a:r>
           </a:p>
           <a:p>
             <a:pPr lvl="2"/>
             <a:r>
-              <a:rPr lang="en-US" smtClean="0"/>
+              <a:rPr lang="en-US"/>
               <a:t>Third level</a:t>
             </a:r>
           </a:p>
           <a:p>
             <a:pPr lvl="3"/>
             <a:r>
-              <a:rPr lang="en-US" smtClean="0"/>
+              <a:rPr lang="en-US"/>
               <a:t>Fourth level</a:t>
             </a:r>
           </a:p>
           <a:p>
             <a:pPr lvl="4"/>
             <a:r>
-              <a:rPr lang="en-US" smtClean="0"/>
+              <a:rPr lang="en-US"/>
               <a:t>Fifth level</a:t>
             </a:r>
             <a:endParaRPr lang="en-SG"/>
@@ -1306,35 +1306,35 @@
           <a:p>
             <a:pPr lvl="0"/>
             <a:r>
-              <a:rPr lang="en-US" smtClean="0"/>
+              <a:rPr lang="en-US"/>
               <a:t>Click to edit Master text styles</a:t>
             </a:r>
           </a:p>
           <a:p>
             <a:pPr lvl="1"/>
             <a:r>
-              <a:rPr lang="en-US" smtClean="0"/>
+              <a:rPr lang="en-US"/>
               <a:t>Second level</a:t>
             </a:r>
           </a:p>
           <a:p>
             <a:pPr lvl="2"/>
             <a:r>
-              <a:rPr lang="en-US" smtClean="0"/>
+              <a:rPr lang="en-US"/>
               <a:t>Third level</a:t>
             </a:r>
           </a:p>
           <a:p>
             <a:pPr lvl="3"/>
             <a:r>
-              <a:rPr lang="en-US" smtClean="0"/>
+              <a:rPr lang="en-US"/>
               <a:t>Fourth level</a:t>
             </a:r>
           </a:p>
           <a:p>
             <a:pPr lvl="4"/>
             <a:r>
-              <a:rPr lang="en-US" smtClean="0"/>
+              <a:rPr lang="en-US"/>
               <a:t>Fifth level</a:t>
             </a:r>
             <a:endParaRPr lang="en-SG"/>
@@ -1358,7 +1358,7 @@
           <a:p>
             <a:fld id="{5C63EA63-0159-4067-AC1E-0A923D89E69F}" type="datetimeFigureOut">
               <a:rPr lang="en-SG" smtClean="0"/>
-              <a:t>3/10/2017</a:t>
+              <a:t>17/9/2023</a:t>
             </a:fld>
             <a:endParaRPr lang="en-SG"/>
           </a:p>
@@ -1456,7 +1456,7 @@
           </a:lstStyle>
           <a:p>
             <a:r>
-              <a:rPr lang="en-US" smtClean="0"/>
+              <a:rPr lang="en-US"/>
               <a:t>Click to edit Master title style</a:t>
             </a:r>
             <a:endParaRPr lang="en-SG"/>
@@ -1522,7 +1522,7 @@
           <a:p>
             <a:pPr lvl="0"/>
             <a:r>
-              <a:rPr lang="en-US" smtClean="0"/>
+              <a:rPr lang="en-US"/>
               <a:t>Click to edit Master text styles</a:t>
             </a:r>
           </a:p>
@@ -1578,35 +1578,35 @@
           <a:p>
             <a:pPr lvl="0"/>
             <a:r>
-              <a:rPr lang="en-US" smtClean="0"/>
+              <a:rPr lang="en-US"/>
               <a:t>Click to edit Master text styles</a:t>
             </a:r>
           </a:p>
           <a:p>
             <a:pPr lvl="1"/>
             <a:r>
-              <a:rPr lang="en-US" smtClean="0"/>
+              <a:rPr lang="en-US"/>
               <a:t>Second level</a:t>
             </a:r>
           </a:p>
           <a:p>
             <a:pPr lvl="2"/>
             <a:r>
-              <a:rPr lang="en-US" smtClean="0"/>
+              <a:rPr lang="en-US"/>
               <a:t>Third level</a:t>
             </a:r>
           </a:p>
           <a:p>
             <a:pPr lvl="3"/>
             <a:r>
-              <a:rPr lang="en-US" smtClean="0"/>
+              <a:rPr lang="en-US"/>
               <a:t>Fourth level</a:t>
             </a:r>
           </a:p>
           <a:p>
             <a:pPr lvl="4"/>
             <a:r>
-              <a:rPr lang="en-US" smtClean="0"/>
+              <a:rPr lang="en-US"/>
               <a:t>Fifth level</a:t>
             </a:r>
             <a:endParaRPr lang="en-SG"/>
@@ -1672,7 +1672,7 @@
           <a:p>
             <a:pPr lvl="0"/>
             <a:r>
-              <a:rPr lang="en-US" smtClean="0"/>
+              <a:rPr lang="en-US"/>
               <a:t>Click to edit Master text styles</a:t>
             </a:r>
           </a:p>
@@ -1728,35 +1728,35 @@
           <a:p>
             <a:pPr lvl="0"/>
             <a:r>
-              <a:rPr lang="en-US" smtClean="0"/>
+              <a:rPr lang="en-US"/>
               <a:t>Click to edit Master text styles</a:t>
             </a:r>
           </a:p>
           <a:p>
             <a:pPr lvl="1"/>
             <a:r>
-              <a:rPr lang="en-US" smtClean="0"/>
+              <a:rPr lang="en-US"/>
               <a:t>Second level</a:t>
             </a:r>
           </a:p>
           <a:p>
             <a:pPr lvl="2"/>
             <a:r>
-              <a:rPr lang="en-US" smtClean="0"/>
+              <a:rPr lang="en-US"/>
               <a:t>Third level</a:t>
             </a:r>
           </a:p>
           <a:p>
             <a:pPr lvl="3"/>
             <a:r>
-              <a:rPr lang="en-US" smtClean="0"/>
+              <a:rPr lang="en-US"/>
               <a:t>Fourth level</a:t>
             </a:r>
           </a:p>
           <a:p>
             <a:pPr lvl="4"/>
             <a:r>
-              <a:rPr lang="en-US" smtClean="0"/>
+              <a:rPr lang="en-US"/>
               <a:t>Fifth level</a:t>
             </a:r>
             <a:endParaRPr lang="en-SG"/>
@@ -1780,7 +1780,7 @@
           <a:p>
             <a:fld id="{5C63EA63-0159-4067-AC1E-0A923D89E69F}" type="datetimeFigureOut">
               <a:rPr lang="en-SG" smtClean="0"/>
-              <a:t>3/10/2017</a:t>
+              <a:t>17/9/2023</a:t>
             </a:fld>
             <a:endParaRPr lang="en-SG"/>
           </a:p>
@@ -1874,7 +1874,7 @@
           <a:lstStyle/>
           <a:p>
             <a:r>
-              <a:rPr lang="en-US" smtClean="0"/>
+              <a:rPr lang="en-US"/>
               <a:t>Click to edit Master title style</a:t>
             </a:r>
             <a:endParaRPr lang="en-SG"/>
@@ -1898,7 +1898,7 @@
           <a:p>
             <a:fld id="{5C63EA63-0159-4067-AC1E-0A923D89E69F}" type="datetimeFigureOut">
               <a:rPr lang="en-SG" smtClean="0"/>
-              <a:t>3/10/2017</a:t>
+              <a:t>17/9/2023</a:t>
             </a:fld>
             <a:endParaRPr lang="en-SG"/>
           </a:p>
@@ -1993,7 +1993,7 @@
           <a:p>
             <a:fld id="{5C63EA63-0159-4067-AC1E-0A923D89E69F}" type="datetimeFigureOut">
               <a:rPr lang="en-SG" smtClean="0"/>
-              <a:t>3/10/2017</a:t>
+              <a:t>17/9/2023</a:t>
             </a:fld>
             <a:endParaRPr lang="en-SG"/>
           </a:p>
@@ -2096,7 +2096,7 @@
           </a:lstStyle>
           <a:p>
             <a:r>
-              <a:rPr lang="en-US" smtClean="0"/>
+              <a:rPr lang="en-US"/>
               <a:t>Click to edit Master title style</a:t>
             </a:r>
             <a:endParaRPr lang="en-SG"/>
@@ -2153,35 +2153,35 @@
           <a:p>
             <a:pPr lvl="0"/>
             <a:r>
-              <a:rPr lang="en-US" smtClean="0"/>
+              <a:rPr lang="en-US"/>
               <a:t>Click to edit Master text styles</a:t>
             </a:r>
           </a:p>
           <a:p>
             <a:pPr lvl="1"/>
             <a:r>
-              <a:rPr lang="en-US" smtClean="0"/>
+              <a:rPr lang="en-US"/>
               <a:t>Second level</a:t>
             </a:r>
           </a:p>
           <a:p>
             <a:pPr lvl="2"/>
             <a:r>
-              <a:rPr lang="en-US" smtClean="0"/>
+              <a:rPr lang="en-US"/>
               <a:t>Third level</a:t>
             </a:r>
           </a:p>
           <a:p>
             <a:pPr lvl="3"/>
             <a:r>
-              <a:rPr lang="en-US" smtClean="0"/>
+              <a:rPr lang="en-US"/>
               <a:t>Fourth level</a:t>
             </a:r>
           </a:p>
           <a:p>
             <a:pPr lvl="4"/>
             <a:r>
-              <a:rPr lang="en-US" smtClean="0"/>
+              <a:rPr lang="en-US"/>
               <a:t>Fifth level</a:t>
             </a:r>
             <a:endParaRPr lang="en-SG"/>
@@ -2247,7 +2247,7 @@
           <a:p>
             <a:pPr lvl="0"/>
             <a:r>
-              <a:rPr lang="en-US" smtClean="0"/>
+              <a:rPr lang="en-US"/>
               <a:t>Click to edit Master text styles</a:t>
             </a:r>
           </a:p>
@@ -2270,7 +2270,7 @@
           <a:p>
             <a:fld id="{5C63EA63-0159-4067-AC1E-0A923D89E69F}" type="datetimeFigureOut">
               <a:rPr lang="en-SG" smtClean="0"/>
-              <a:t>3/10/2017</a:t>
+              <a:t>17/9/2023</a:t>
             </a:fld>
             <a:endParaRPr lang="en-SG"/>
           </a:p>
@@ -2373,7 +2373,7 @@
           </a:lstStyle>
           <a:p>
             <a:r>
-              <a:rPr lang="en-US" smtClean="0"/>
+              <a:rPr lang="en-US"/>
               <a:t>Click to edit Master title style</a:t>
             </a:r>
             <a:endParaRPr lang="en-SG"/>
@@ -2500,7 +2500,7 @@
           <a:p>
             <a:pPr lvl="0"/>
             <a:r>
-              <a:rPr lang="en-US" smtClean="0"/>
+              <a:rPr lang="en-US"/>
               <a:t>Click to edit Master text styles</a:t>
             </a:r>
           </a:p>
@@ -2523,7 +2523,7 @@
           <a:p>
             <a:fld id="{5C63EA63-0159-4067-AC1E-0A923D89E69F}" type="datetimeFigureOut">
               <a:rPr lang="en-SG" smtClean="0"/>
-              <a:t>3/10/2017</a:t>
+              <a:t>17/9/2023</a:t>
             </a:fld>
             <a:endParaRPr lang="en-SG"/>
           </a:p>
@@ -2632,7 +2632,7 @@
           <a:lstStyle/>
           <a:p>
             <a:r>
-              <a:rPr lang="en-US" smtClean="0"/>
+              <a:rPr lang="en-US"/>
               <a:t>Click to edit Master title style</a:t>
             </a:r>
             <a:endParaRPr lang="en-SG"/>
@@ -2666,35 +2666,35 @@
           <a:p>
             <a:pPr lvl="0"/>
             <a:r>
-              <a:rPr lang="en-US" smtClean="0"/>
+              <a:rPr lang="en-US"/>
               <a:t>Click to edit Master text styles</a:t>
             </a:r>
           </a:p>
           <a:p>
             <a:pPr lvl="1"/>
             <a:r>
-              <a:rPr lang="en-US" smtClean="0"/>
+              <a:rPr lang="en-US"/>
               <a:t>Second level</a:t>
             </a:r>
           </a:p>
           <a:p>
             <a:pPr lvl="2"/>
             <a:r>
-              <a:rPr lang="en-US" smtClean="0"/>
+              <a:rPr lang="en-US"/>
               <a:t>Third level</a:t>
             </a:r>
           </a:p>
           <a:p>
             <a:pPr lvl="3"/>
             <a:r>
-              <a:rPr lang="en-US" smtClean="0"/>
+              <a:rPr lang="en-US"/>
               <a:t>Fourth level</a:t>
             </a:r>
           </a:p>
           <a:p>
             <a:pPr lvl="4"/>
             <a:r>
-              <a:rPr lang="en-US" smtClean="0"/>
+              <a:rPr lang="en-US"/>
               <a:t>Fifth level</a:t>
             </a:r>
             <a:endParaRPr lang="en-SG"/>
@@ -2736,7 +2736,7 @@
           <a:p>
             <a:fld id="{5C63EA63-0159-4067-AC1E-0A923D89E69F}" type="datetimeFigureOut">
               <a:rPr lang="en-SG" smtClean="0"/>
-              <a:t>3/10/2017</a:t>
+              <a:t>17/9/2023</a:t>
             </a:fld>
             <a:endParaRPr lang="en-SG"/>
           </a:p>
@@ -3512,7 +3512,7 @@
             </a:lstStyle>
             <a:p>
               <a:r>
-                <a:rPr lang="en-US" sz="2000" dirty="0" smtClean="0">
+                <a:rPr lang="en-US" sz="2000" dirty="0">
                   <a:solidFill>
                     <a:schemeClr val="tx1"/>
                   </a:solidFill>
@@ -3520,12 +3520,6 @@
                 </a:rPr>
                 <a:t>opt    [valid]</a:t>
               </a:r>
-              <a:endParaRPr lang="en-US" sz="2000" dirty="0">
-                <a:solidFill>
-                  <a:schemeClr val="tx1"/>
-                </a:solidFill>
-                <a:cs typeface="Arial" charset="0"/>
-              </a:endParaRPr>
             </a:p>
           </p:txBody>
         </p:sp>
@@ -3538,10 +3532,10 @@
         </p:nvGrpSpPr>
         <p:grpSpPr>
           <a:xfrm>
-            <a:off x="1979712" y="3792055"/>
-            <a:ext cx="5112568" cy="1315618"/>
+            <a:off x="2141824" y="3792054"/>
+            <a:ext cx="5248018" cy="1290741"/>
             <a:chOff x="-1917357" y="2564094"/>
-            <a:chExt cx="5112568" cy="1315618"/>
+            <a:chExt cx="5112568" cy="1240357"/>
           </a:xfrm>
         </p:grpSpPr>
         <p:sp>
@@ -3555,7 +3549,7 @@
           <p:spPr bwMode="auto">
             <a:xfrm>
               <a:off x="-1917356" y="2569474"/>
-              <a:ext cx="5112567" cy="1310238"/>
+              <a:ext cx="5112567" cy="1234977"/>
             </a:xfrm>
             <a:prstGeom prst="rect">
               <a:avLst/>
@@ -3778,8 +3772,8 @@
           </p:nvSpPr>
           <p:spPr bwMode="auto">
             <a:xfrm>
-              <a:off x="-1917356" y="2569474"/>
-              <a:ext cx="3718317" cy="283462"/>
+              <a:off x="-1917355" y="2569474"/>
+              <a:ext cx="2675641" cy="258678"/>
             </a:xfrm>
             <a:prstGeom prst="rect">
               <a:avLst/>
@@ -3934,7 +3928,7 @@
             </a:lstStyle>
             <a:p>
               <a:r>
-                <a:rPr lang="en-US" sz="2000" dirty="0" smtClean="0">
+                <a:rPr lang="en-US" sz="2000" dirty="0">
                   <a:solidFill>
                     <a:srgbClr val="7030A0"/>
                   </a:solidFill>
@@ -3943,16 +3937,16 @@
                 <a:t>alt</a:t>
               </a:r>
               <a:r>
-                <a:rPr lang="en-US" sz="2400" dirty="0" smtClean="0">
+                <a:rPr lang="en-US" sz="2400" dirty="0">
                   <a:solidFill>
                     <a:srgbClr val="7030A0"/>
                   </a:solidFill>
                   <a:cs typeface="Arial" charset="0"/>
                 </a:rPr>
-                <a:t>     </a:t>
+                <a:t>   </a:t>
               </a:r>
               <a:r>
-                <a:rPr lang="en-US" sz="2000" dirty="0" smtClean="0">
+                <a:rPr lang="en-US" sz="2000" dirty="0">
                   <a:solidFill>
                     <a:srgbClr val="7030A0"/>
                   </a:solidFill>
@@ -3960,12 +3954,6 @@
                 </a:rPr>
                 <a:t>[forward]</a:t>
               </a:r>
-              <a:endParaRPr lang="en-US" sz="2000" dirty="0">
-                <a:solidFill>
-                  <a:srgbClr val="7030A0"/>
-                </a:solidFill>
-                <a:cs typeface="Arial" charset="0"/>
-              </a:endParaRPr>
             </a:p>
           </p:txBody>
         </p:sp>
@@ -4013,7 +4001,7 @@
           </p:nvSpPr>
           <p:spPr>
             <a:xfrm>
-              <a:off x="-1332656" y="3162710"/>
+              <a:off x="-1564215" y="3162710"/>
               <a:ext cx="1350050" cy="400110"/>
             </a:xfrm>
             <a:prstGeom prst="rect">
@@ -4027,7 +4015,7 @@
             <a:lstStyle/>
             <a:p>
               <a:r>
-                <a:rPr lang="en-US" sz="2000" dirty="0" smtClean="0">
+                <a:rPr lang="en-US" sz="2000" dirty="0">
                   <a:solidFill>
                     <a:srgbClr val="7030A0"/>
                   </a:solidFill>
@@ -4035,12 +4023,6 @@
                 </a:rPr>
                 <a:t>[backward]</a:t>
               </a:r>
-              <a:endParaRPr lang="en-US" sz="2000" dirty="0">
-                <a:solidFill>
-                  <a:srgbClr val="7030A0"/>
-                </a:solidFill>
-                <a:cs typeface="Arial" charset="0"/>
-              </a:endParaRPr>
             </a:p>
           </p:txBody>
         </p:sp>
@@ -4055,8 +4037,8 @@
         </p:nvSpPr>
         <p:spPr bwMode="auto">
           <a:xfrm>
-            <a:off x="4019491" y="1216339"/>
-            <a:ext cx="0" cy="4470476"/>
+            <a:off x="4019491" y="1216338"/>
+            <a:ext cx="0" cy="4660933"/>
           </a:xfrm>
           <a:prstGeom prst="line">
             <a:avLst/>
@@ -4141,7 +4123,7 @@
               <a:buNone/>
             </a:pPr>
             <a:r>
-              <a:rPr lang="en-US" sz="2000" dirty="0" smtClean="0">
+              <a:rPr lang="en-US" sz="2000" dirty="0">
                 <a:solidFill>
                   <a:schemeClr val="tx1"/>
                 </a:solidFill>
@@ -4149,7 +4131,7 @@
               <a:t>:</a:t>
             </a:r>
             <a:r>
-              <a:rPr lang="en-US" sz="2000" dirty="0" err="1" smtClean="0">
+              <a:rPr lang="en-US" sz="2000" dirty="0" err="1">
                 <a:solidFill>
                   <a:schemeClr val="tx1"/>
                 </a:solidFill>
@@ -4206,8 +4188,8 @@
         </p:nvSpPr>
         <p:spPr>
           <a:xfrm>
-            <a:off x="3880947" y="1703083"/>
-            <a:ext cx="231797" cy="3551684"/>
+            <a:off x="3880948" y="1703083"/>
+            <a:ext cx="237904" cy="3977970"/>
           </a:xfrm>
           <a:prstGeom prst="rect">
             <a:avLst/>
@@ -4449,18 +4431,13 @@
               <a:buNone/>
             </a:pPr>
             <a:r>
-              <a:rPr lang="en-US" sz="2000" dirty="0" smtClean="0">
+              <a:rPr lang="en-US" sz="2000" dirty="0">
                 <a:solidFill>
                   <a:schemeClr val="tx1"/>
                 </a:solidFill>
               </a:rPr>
               <a:t>:Parser</a:t>
             </a:r>
-            <a:endParaRPr lang="en-US" sz="2000" dirty="0">
-              <a:solidFill>
-                <a:schemeClr val="tx1"/>
-              </a:solidFill>
-            </a:endParaRPr>
           </a:p>
         </p:txBody>
       </p:sp>
@@ -4502,14 +4479,13 @@
               <a:buNone/>
             </a:pPr>
             <a:r>
-              <a:rPr lang="en-US" sz="2000" dirty="0" err="1" smtClean="0"/>
+              <a:rPr lang="en-US" sz="2000" dirty="0" err="1"/>
               <a:t>createParser</a:t>
             </a:r>
             <a:r>
-              <a:rPr lang="en-US" sz="2000" dirty="0" smtClean="0"/>
+              <a:rPr lang="en-US" sz="2000" dirty="0"/>
               <a:t>()</a:t>
             </a:r>
-            <a:endParaRPr lang="en-US" sz="2000" dirty="0"/>
           </a:p>
         </p:txBody>
       </p:sp>
@@ -4521,8 +4497,8 @@
         </p:nvGrpSpPr>
         <p:grpSpPr>
           <a:xfrm>
-            <a:off x="4101501" y="1737739"/>
-            <a:ext cx="276298" cy="210590"/>
+            <a:off x="4129186" y="1745028"/>
+            <a:ext cx="177617" cy="210590"/>
             <a:chOff x="2660072" y="4394662"/>
             <a:chExt cx="276298" cy="210590"/>
           </a:xfrm>
@@ -4643,22 +4619,24 @@
         </p:nvGrpSpPr>
         <p:grpSpPr>
           <a:xfrm>
-            <a:off x="4007687" y="2163857"/>
-            <a:ext cx="276298" cy="210590"/>
-            <a:chOff x="2660072" y="4394662"/>
-            <a:chExt cx="276298" cy="210590"/>
+            <a:off x="4097800" y="2139672"/>
+            <a:ext cx="182879" cy="224099"/>
+            <a:chOff x="2753491" y="4381153"/>
+            <a:chExt cx="182879" cy="224099"/>
           </a:xfrm>
         </p:grpSpPr>
         <p:cxnSp>
           <p:nvCxnSpPr>
             <p:cNvPr id="33" name="Straight Connector 32"/>
-            <p:cNvCxnSpPr/>
+            <p:cNvCxnSpPr>
+              <a:cxnSpLocks/>
+            </p:cNvCxnSpPr>
             <p:nvPr/>
           </p:nvCxnSpPr>
           <p:spPr>
             <a:xfrm>
-              <a:off x="2660072" y="4394662"/>
-              <a:ext cx="276298" cy="0"/>
+              <a:off x="2842556" y="4394662"/>
+              <a:ext cx="93814" cy="0"/>
             </a:xfrm>
             <a:prstGeom prst="line">
               <a:avLst/>
@@ -4688,13 +4666,15 @@
         <p:cxnSp>
           <p:nvCxnSpPr>
             <p:cNvPr id="37" name="Straight Connector 36"/>
-            <p:cNvCxnSpPr/>
+            <p:cNvCxnSpPr>
+              <a:cxnSpLocks/>
+            </p:cNvCxnSpPr>
             <p:nvPr/>
           </p:nvCxnSpPr>
           <p:spPr>
-            <a:xfrm rot="5400000">
-              <a:off x="2871058" y="4455225"/>
-              <a:ext cx="110045" cy="1"/>
+            <a:xfrm flipH="1">
+              <a:off x="2923534" y="4381153"/>
+              <a:ext cx="2548" cy="104099"/>
             </a:xfrm>
             <a:prstGeom prst="line">
               <a:avLst/>
@@ -4768,8 +4748,8 @@
         </p:nvSpPr>
         <p:spPr>
           <a:xfrm>
-            <a:off x="3953574" y="1950945"/>
-            <a:ext cx="259630" cy="214377"/>
+            <a:off x="4004250" y="1950945"/>
+            <a:ext cx="193713" cy="214377"/>
           </a:xfrm>
           <a:prstGeom prst="rect">
             <a:avLst/>
@@ -4837,14 +4817,13 @@
               <a:buNone/>
             </a:pPr>
             <a:r>
-              <a:rPr lang="en-US" sz="2000" dirty="0" err="1" smtClean="0"/>
+              <a:rPr lang="en-US" sz="2000" dirty="0" err="1"/>
               <a:t>checkParams</a:t>
             </a:r>
             <a:r>
-              <a:rPr lang="en-US" sz="2000" dirty="0" smtClean="0"/>
+              <a:rPr lang="en-US" sz="2000" dirty="0"/>
               <a:t>()</a:t>
             </a:r>
-            <a:endParaRPr lang="en-US" sz="2000" dirty="0"/>
           </a:p>
         </p:txBody>
       </p:sp>
@@ -4856,8 +4835,8 @@
         </p:nvSpPr>
         <p:spPr>
           <a:xfrm>
-            <a:off x="3980497" y="3233442"/>
-            <a:ext cx="259630" cy="225659"/>
+            <a:off x="4017509" y="3233442"/>
+            <a:ext cx="200891" cy="304780"/>
           </a:xfrm>
           <a:prstGeom prst="rect">
             <a:avLst/>
@@ -4897,8 +4876,8 @@
         </p:nvSpPr>
         <p:spPr bwMode="auto">
           <a:xfrm flipH="1" flipV="1">
-            <a:off x="4255551" y="3233441"/>
-            <a:ext cx="2495263" cy="0"/>
+            <a:off x="4218400" y="3233442"/>
+            <a:ext cx="2532415" cy="0"/>
           </a:xfrm>
           <a:prstGeom prst="line">
             <a:avLst/>
@@ -4959,14 +4938,13 @@
               <a:buNone/>
             </a:pPr>
             <a:r>
-              <a:rPr lang="en-US" sz="2000" dirty="0" err="1" smtClean="0"/>
+              <a:rPr lang="en-US" sz="2000" dirty="0" err="1"/>
               <a:t>getInfo</a:t>
             </a:r>
             <a:r>
-              <a:rPr lang="en-US" sz="2000" dirty="0" smtClean="0"/>
+              <a:rPr lang="en-US" sz="2000" dirty="0"/>
               <a:t>()</a:t>
             </a:r>
-            <a:endParaRPr lang="en-US" sz="2000" dirty="0"/>
           </a:p>
         </p:txBody>
       </p:sp>
@@ -4980,7 +4958,7 @@
         </p:nvSpPr>
         <p:spPr bwMode="auto">
           <a:xfrm>
-            <a:off x="4146160" y="4203465"/>
+            <a:off x="4146160" y="4009497"/>
             <a:ext cx="2590800" cy="0"/>
           </a:xfrm>
           <a:prstGeom prst="line">
@@ -5014,7 +4992,7 @@
         </p:nvSpPr>
         <p:spPr bwMode="auto">
           <a:xfrm>
-            <a:off x="4802999" y="3814607"/>
+            <a:off x="4782073" y="3983933"/>
             <a:ext cx="1455203" cy="400110"/>
           </a:xfrm>
           <a:prstGeom prst="rect">
@@ -5042,10 +5020,9 @@
               <a:buNone/>
             </a:pPr>
             <a:r>
-              <a:rPr lang="en-US" sz="2000" dirty="0" smtClean="0"/>
+              <a:rPr lang="en-US" sz="2000" dirty="0"/>
               <a:t>set()</a:t>
             </a:r>
-            <a:endParaRPr lang="en-US" sz="2000" dirty="0"/>
           </a:p>
         </p:txBody>
       </p:sp>
@@ -5057,8 +5034,8 @@
         </p:nvSpPr>
         <p:spPr>
           <a:xfrm>
-            <a:off x="6750815" y="4199032"/>
-            <a:ext cx="251361" cy="164721"/>
+            <a:off x="6750815" y="4005063"/>
+            <a:ext cx="251359" cy="311583"/>
           </a:xfrm>
           <a:prstGeom prst="rect">
             <a:avLst/>
@@ -5102,7 +5079,7 @@
         </p:nvSpPr>
         <p:spPr bwMode="auto">
           <a:xfrm>
-            <a:off x="4146160" y="4818503"/>
+            <a:off x="4146160" y="4645405"/>
             <a:ext cx="2590800" cy="0"/>
           </a:xfrm>
           <a:prstGeom prst="line">
@@ -5136,7 +5113,7 @@
         </p:nvSpPr>
         <p:spPr bwMode="auto">
           <a:xfrm>
-            <a:off x="4802999" y="4429645"/>
+            <a:off x="4710885" y="4581128"/>
             <a:ext cx="1455203" cy="400110"/>
           </a:xfrm>
           <a:prstGeom prst="rect">
@@ -5164,10 +5141,9 @@
               <a:buNone/>
             </a:pPr>
             <a:r>
-              <a:rPr lang="en-US" sz="2000" dirty="0" smtClean="0"/>
+              <a:rPr lang="en-US" sz="2000" dirty="0"/>
               <a:t>reset()</a:t>
             </a:r>
-            <a:endParaRPr lang="en-US" sz="2000" dirty="0"/>
           </a:p>
         </p:txBody>
       </p:sp>
@@ -5179,8 +5155,8 @@
         </p:nvSpPr>
         <p:spPr>
           <a:xfrm>
-            <a:off x="6750815" y="4814070"/>
-            <a:ext cx="251361" cy="164721"/>
+            <a:off x="6750815" y="4640972"/>
+            <a:ext cx="251361" cy="249821"/>
           </a:xfrm>
           <a:prstGeom prst="rect">
             <a:avLst/>

</xml_diff>